<commit_message>
output tex ready for grammar correction
</commit_message>
<xml_diff>
--- a/_figure/results/rdf-smoothing.pptx
+++ b/_figure/results/rdf-smoothing.pptx
@@ -310,7 +310,7 @@
                   <c:v>4.04166666666666</c:v>
                 </c:pt>
                 <c:pt idx="50" formatCode="General">
-                  <c:v>4.124999999999997</c:v>
+                  <c:v>4.124999999999996</c:v>
                 </c:pt>
                 <c:pt idx="51" formatCode="General">
                   <c:v>4.20833333333333</c:v>
@@ -328,7 +328,7 @@
                   <c:v>4.54166666666666</c:v>
                 </c:pt>
                 <c:pt idx="56" formatCode="General">
-                  <c:v>4.624999999999997</c:v>
+                  <c:v>4.624999999999995</c:v>
                 </c:pt>
                 <c:pt idx="57" formatCode="General">
                   <c:v>4.70833333333333</c:v>
@@ -346,7 +346,7 @@
                   <c:v>5.04166666666666</c:v>
                 </c:pt>
                 <c:pt idx="62" formatCode="General">
-                  <c:v>5.124999999999997</c:v>
+                  <c:v>5.124999999999996</c:v>
                 </c:pt>
                 <c:pt idx="63" formatCode="General">
                   <c:v>5.20833333333333</c:v>
@@ -364,7 +364,7 @@
                   <c:v>5.54166666666666</c:v>
                 </c:pt>
                 <c:pt idx="68" formatCode="General">
-                  <c:v>5.624999999999997</c:v>
+                  <c:v>5.624999999999995</c:v>
                 </c:pt>
                 <c:pt idx="69" formatCode="General">
                   <c:v>5.70833333333333</c:v>
@@ -382,7 +382,7 @@
                   <c:v>6.04166666666666</c:v>
                 </c:pt>
                 <c:pt idx="74" formatCode="General">
-                  <c:v>6.124999999999997</c:v>
+                  <c:v>6.124999999999996</c:v>
                 </c:pt>
                 <c:pt idx="75" formatCode="General">
                   <c:v>6.20833333333333</c:v>
@@ -400,7 +400,7 @@
                   <c:v>6.54166666666666</c:v>
                 </c:pt>
                 <c:pt idx="80" formatCode="General">
-                  <c:v>6.624999999999997</c:v>
+                  <c:v>6.624999999999995</c:v>
                 </c:pt>
                 <c:pt idx="81" formatCode="General">
                   <c:v>6.70833333333333</c:v>
@@ -418,7 +418,7 @@
                   <c:v>7.04166666666666</c:v>
                 </c:pt>
                 <c:pt idx="86" formatCode="General">
-                  <c:v>7.124999999999997</c:v>
+                  <c:v>7.124999999999996</c:v>
                 </c:pt>
                 <c:pt idx="87" formatCode="General">
                   <c:v>7.20833333333333</c:v>
@@ -436,7 +436,7 @@
                   <c:v>7.54166666666666</c:v>
                 </c:pt>
                 <c:pt idx="92" formatCode="General">
-                  <c:v>7.624999999999997</c:v>
+                  <c:v>7.624999999999995</c:v>
                 </c:pt>
                 <c:pt idx="93" formatCode="General">
                   <c:v>7.70833333333333</c:v>
@@ -457,7 +457,7 @@
                   <c:v>8.125</c:v>
                 </c:pt>
                 <c:pt idx="99" formatCode="General">
-                  <c:v>8.208333333333327</c:v>
+                  <c:v>8.208333333333325</c:v>
                 </c:pt>
                 <c:pt idx="100" formatCode="General">
                   <c:v>8.29166666666666</c:v>
@@ -475,7 +475,7 @@
                   <c:v>8.625</c:v>
                 </c:pt>
                 <c:pt idx="105" formatCode="General">
-                  <c:v>8.708333333333327</c:v>
+                  <c:v>8.708333333333325</c:v>
                 </c:pt>
                 <c:pt idx="106" formatCode="General">
                   <c:v>8.79166666666666</c:v>
@@ -493,7 +493,7 @@
                   <c:v>9.125</c:v>
                 </c:pt>
                 <c:pt idx="111" formatCode="General">
-                  <c:v>9.208333333333327</c:v>
+                  <c:v>9.208333333333325</c:v>
                 </c:pt>
                 <c:pt idx="112" formatCode="General">
                   <c:v>9.29166666666666</c:v>
@@ -511,7 +511,7 @@
                   <c:v>9.625</c:v>
                 </c:pt>
                 <c:pt idx="117" formatCode="General">
-                  <c:v>9.708333333333327</c:v>
+                  <c:v>9.708333333333325</c:v>
                 </c:pt>
                 <c:pt idx="118" formatCode="General">
                   <c:v>9.79166666666666</c:v>
@@ -1611,49 +1611,49 @@
                   <c:v>3.875</c:v>
                 </c:pt>
                 <c:pt idx="17">
-                  <c:v>4.124999999999997</c:v>
+                  <c:v>4.124999999999996</c:v>
                 </c:pt>
                 <c:pt idx="18">
                   <c:v>4.375</c:v>
                 </c:pt>
                 <c:pt idx="19">
-                  <c:v>4.624999999999997</c:v>
+                  <c:v>4.624999999999995</c:v>
                 </c:pt>
                 <c:pt idx="20">
                   <c:v>4.875</c:v>
                 </c:pt>
                 <c:pt idx="21">
-                  <c:v>5.124999999999997</c:v>
+                  <c:v>5.124999999999996</c:v>
                 </c:pt>
                 <c:pt idx="22">
                   <c:v>5.375</c:v>
                 </c:pt>
                 <c:pt idx="23">
-                  <c:v>5.624999999999997</c:v>
+                  <c:v>5.624999999999995</c:v>
                 </c:pt>
                 <c:pt idx="24">
                   <c:v>5.875</c:v>
                 </c:pt>
                 <c:pt idx="25">
-                  <c:v>6.124999999999997</c:v>
+                  <c:v>6.124999999999996</c:v>
                 </c:pt>
                 <c:pt idx="26">
                   <c:v>6.375</c:v>
                 </c:pt>
                 <c:pt idx="27">
-                  <c:v>6.624999999999997</c:v>
+                  <c:v>6.624999999999995</c:v>
                 </c:pt>
                 <c:pt idx="28">
                   <c:v>6.875</c:v>
                 </c:pt>
                 <c:pt idx="29">
-                  <c:v>7.124999999999997</c:v>
+                  <c:v>7.124999999999996</c:v>
                 </c:pt>
                 <c:pt idx="30">
                   <c:v>7.375</c:v>
                 </c:pt>
                 <c:pt idx="31">
-                  <c:v>7.624999999999997</c:v>
+                  <c:v>7.624999999999995</c:v>
                 </c:pt>
                 <c:pt idx="32">
                   <c:v>7.875</c:v>
@@ -2189,7 +2189,7 @@
                   <c:v>2.27586206896551</c:v>
                 </c:pt>
                 <c:pt idx="7">
-                  <c:v>2.689655172413788</c:v>
+                  <c:v>2.689655172413787</c:v>
                 </c:pt>
                 <c:pt idx="8">
                   <c:v>3.10344827586206</c:v>
@@ -2201,7 +2201,7 @@
                   <c:v>3.93103448275862</c:v>
                 </c:pt>
                 <c:pt idx="11">
-                  <c:v>4.344827586206888</c:v>
+                  <c:v>4.344827586206887</c:v>
                 </c:pt>
                 <c:pt idx="12">
                   <c:v>4.75862068965517</c:v>
@@ -2219,7 +2219,7 @@
                   <c:v>6.41379310344827</c:v>
                 </c:pt>
                 <c:pt idx="17">
-                  <c:v>6.827586206896544</c:v>
+                  <c:v>6.827586206896542</c:v>
                 </c:pt>
                 <c:pt idx="18">
                   <c:v>7.24137931034482</c:v>
@@ -2240,7 +2240,7 @@
                   <c:v>9.3103448275862</c:v>
                 </c:pt>
                 <c:pt idx="24">
-                  <c:v>9.724137931034477</c:v>
+                  <c:v>9.724137931034475</c:v>
                 </c:pt>
                 <c:pt idx="25">
                   <c:v>10.1379310344827</c:v>
@@ -2617,7 +2617,7 @@
                   <c:v>4.28571428571428</c:v>
                 </c:pt>
                 <c:pt idx="9">
-                  <c:v>4.857142857142848</c:v>
+                  <c:v>4.857142857142847</c:v>
                 </c:pt>
                 <c:pt idx="10">
                   <c:v>5.42857142857142</c:v>
@@ -2632,7 +2632,7 @@
                   <c:v>7.14285714285714</c:v>
                 </c:pt>
                 <c:pt idx="14">
-                  <c:v>7.714285714285708</c:v>
+                  <c:v>7.714285714285707</c:v>
                 </c:pt>
                 <c:pt idx="15">
                   <c:v>8.28571428571428</c:v>
@@ -2641,7 +2641,7 @@
                   <c:v>8.85714285714285</c:v>
                 </c:pt>
                 <c:pt idx="17">
-                  <c:v>9.428571428571413</c:v>
+                  <c:v>9.428571428571411</c:v>
                 </c:pt>
                 <c:pt idx="18">
                   <c:v>10.0</c:v>
@@ -2903,11 +2903,11 @@
           <c:showPercent val="0"/>
           <c:showBubbleSize val="0"/>
         </c:dLbls>
-        <c:axId val="-2147428264"/>
-        <c:axId val="-2097232840"/>
+        <c:axId val="-2143948616"/>
+        <c:axId val="-2143946584"/>
       </c:scatterChart>
       <c:valAx>
-        <c:axId val="-2147428264"/>
+        <c:axId val="-2143948616"/>
         <c:scaling>
           <c:orientation val="minMax"/>
           <c:max val="10.0"/>
@@ -2922,10 +2922,10 @@
               <a:lstStyle/>
               <a:p>
                 <a:pPr algn="ctr" rtl="0">
-                  <a:defRPr sz="1800"/>
+                  <a:defRPr/>
                 </a:pPr>
                 <a:r>
-                  <a:rPr lang="mr-IN" sz="1800"/>
+                  <a:rPr lang="mr-IN"/>
                   <a:t>r [Å]</a:t>
                 </a:r>
               </a:p>
@@ -2945,22 +2945,12 @@
             </a:solidFill>
           </a:ln>
         </c:spPr>
-        <c:txPr>
-          <a:bodyPr/>
-          <a:lstStyle/>
-          <a:p>
-            <a:pPr>
-              <a:defRPr sz="1800"/>
-            </a:pPr>
-            <a:endParaRPr lang="zh-CN"/>
-          </a:p>
-        </c:txPr>
-        <c:crossAx val="-2097232840"/>
+        <c:crossAx val="-2143946584"/>
         <c:crosses val="autoZero"/>
         <c:crossBetween val="midCat"/>
       </c:valAx>
       <c:valAx>
-        <c:axId val="-2097232840"/>
+        <c:axId val="-2143946584"/>
         <c:scaling>
           <c:orientation val="minMax"/>
           <c:max val="2.4"/>
@@ -2975,17 +2965,24 @@
               <a:lstStyle/>
               <a:p>
                 <a:pPr>
-                  <a:defRPr sz="1800"/>
+                  <a:defRPr/>
                 </a:pPr>
                 <a:r>
-                  <a:rPr lang="en-US" sz="1800"/>
+                  <a:rPr lang="en-US"/>
                   <a:t>g(r)</a:t>
                 </a:r>
-                <a:endParaRPr lang="zh-CN" sz="1800"/>
+                <a:endParaRPr lang="zh-CN"/>
               </a:p>
             </c:rich>
           </c:tx>
-          <c:layout/>
+          <c:layout>
+            <c:manualLayout>
+              <c:xMode val="edge"/>
+              <c:yMode val="edge"/>
+              <c:x val="0.00749051678667783"/>
+              <c:y val="0.387273863049195"/>
+            </c:manualLayout>
+          </c:layout>
           <c:overlay val="0"/>
         </c:title>
         <c:numFmt formatCode="General" sourceLinked="1"/>
@@ -2999,17 +2996,7 @@
             </a:solidFill>
           </a:ln>
         </c:spPr>
-        <c:txPr>
-          <a:bodyPr/>
-          <a:lstStyle/>
-          <a:p>
-            <a:pPr>
-              <a:defRPr sz="1800"/>
-            </a:pPr>
-            <a:endParaRPr lang="zh-CN"/>
-          </a:p>
-        </c:txPr>
-        <c:crossAx val="-2147428264"/>
+        <c:crossAx val="-2143948616"/>
         <c:crosses val="autoZero"/>
         <c:crossBetween val="midCat"/>
         <c:majorUnit val="0.4"/>
@@ -3036,16 +3023,6 @@
         </c:manualLayout>
       </c:layout>
       <c:overlay val="1"/>
-      <c:txPr>
-        <a:bodyPr/>
-        <a:lstStyle/>
-        <a:p>
-          <a:pPr>
-            <a:defRPr sz="1800"/>
-          </a:pPr>
-          <a:endParaRPr lang="zh-CN"/>
-        </a:p>
-      </c:txPr>
     </c:legend>
     <c:plotVisOnly val="1"/>
     <c:dispBlanksAs val="gap"/>
@@ -3062,7 +3039,7 @@
     <a:lstStyle/>
     <a:p>
       <a:pPr>
-        <a:defRPr sz="1200">
+        <a:defRPr sz="2400">
           <a:latin typeface="Times New Roman"/>
           <a:cs typeface="Times New Roman"/>
         </a:defRPr>
@@ -3098,9 +3075,9 @@
           <c:xMode val="edge"/>
           <c:yMode val="edge"/>
           <c:x val="0.0"/>
-          <c:y val="0.0476042504973145"/>
-          <c:w val="0.978409341588207"/>
-          <c:h val="0.895270648905908"/>
+          <c:y val="0.0595075931776374"/>
+          <c:w val="0.961671784598759"/>
+          <c:h val="0.855592782732144"/>
         </c:manualLayout>
       </c:layout>
       <c:scatterChart>
@@ -3289,7 +3266,7 @@
                   <c:v>4.04166666666666</c:v>
                 </c:pt>
                 <c:pt idx="50" formatCode="General">
-                  <c:v>4.124999999999995</c:v>
+                  <c:v>4.124999999999994</c:v>
                 </c:pt>
                 <c:pt idx="51" formatCode="General">
                   <c:v>4.20833333333333</c:v>
@@ -3307,7 +3284,7 @@
                   <c:v>4.54166666666666</c:v>
                 </c:pt>
                 <c:pt idx="56" formatCode="General">
-                  <c:v>4.624999999999994</c:v>
+                  <c:v>4.624999999999993</c:v>
                 </c:pt>
                 <c:pt idx="57" formatCode="General">
                   <c:v>4.70833333333333</c:v>
@@ -3325,7 +3302,7 @@
                   <c:v>5.04166666666666</c:v>
                 </c:pt>
                 <c:pt idx="62" formatCode="General">
-                  <c:v>5.124999999999995</c:v>
+                  <c:v>5.124999999999994</c:v>
                 </c:pt>
                 <c:pt idx="63" formatCode="General">
                   <c:v>5.20833333333333</c:v>
@@ -3343,7 +3320,7 @@
                   <c:v>5.54166666666666</c:v>
                 </c:pt>
                 <c:pt idx="68" formatCode="General">
-                  <c:v>5.624999999999994</c:v>
+                  <c:v>5.624999999999993</c:v>
                 </c:pt>
                 <c:pt idx="69" formatCode="General">
                   <c:v>5.70833333333333</c:v>
@@ -3361,7 +3338,7 @@
                   <c:v>6.04166666666666</c:v>
                 </c:pt>
                 <c:pt idx="74" formatCode="General">
-                  <c:v>6.124999999999995</c:v>
+                  <c:v>6.124999999999994</c:v>
                 </c:pt>
                 <c:pt idx="75" formatCode="General">
                   <c:v>6.20833333333333</c:v>
@@ -3379,7 +3356,7 @@
                   <c:v>6.54166666666666</c:v>
                 </c:pt>
                 <c:pt idx="80" formatCode="General">
-                  <c:v>6.624999999999994</c:v>
+                  <c:v>6.624999999999993</c:v>
                 </c:pt>
                 <c:pt idx="81" formatCode="General">
                   <c:v>6.70833333333333</c:v>
@@ -3397,7 +3374,7 @@
                   <c:v>7.04166666666666</c:v>
                 </c:pt>
                 <c:pt idx="86" formatCode="General">
-                  <c:v>7.124999999999995</c:v>
+                  <c:v>7.124999999999994</c:v>
                 </c:pt>
                 <c:pt idx="87" formatCode="General">
                   <c:v>7.20833333333333</c:v>
@@ -3415,7 +3392,7 @@
                   <c:v>7.54166666666666</c:v>
                 </c:pt>
                 <c:pt idx="92" formatCode="General">
-                  <c:v>7.624999999999994</c:v>
+                  <c:v>7.624999999999993</c:v>
                 </c:pt>
                 <c:pt idx="93" formatCode="General">
                   <c:v>7.70833333333333</c:v>
@@ -3436,7 +3413,7 @@
                   <c:v>8.125</c:v>
                 </c:pt>
                 <c:pt idx="99" formatCode="General">
-                  <c:v>8.208333333333323</c:v>
+                  <c:v>8.208333333333321</c:v>
                 </c:pt>
                 <c:pt idx="100" formatCode="General">
                   <c:v>8.29166666666666</c:v>
@@ -3454,7 +3431,7 @@
                   <c:v>8.625</c:v>
                 </c:pt>
                 <c:pt idx="105" formatCode="General">
-                  <c:v>8.708333333333323</c:v>
+                  <c:v>8.708333333333321</c:v>
                 </c:pt>
                 <c:pt idx="106" formatCode="General">
                   <c:v>8.79166666666666</c:v>
@@ -3472,7 +3449,7 @@
                   <c:v>9.125</c:v>
                 </c:pt>
                 <c:pt idx="111" formatCode="General">
-                  <c:v>9.208333333333323</c:v>
+                  <c:v>9.208333333333321</c:v>
                 </c:pt>
                 <c:pt idx="112" formatCode="General">
                   <c:v>9.29166666666666</c:v>
@@ -3490,7 +3467,7 @@
                   <c:v>9.625</c:v>
                 </c:pt>
                 <c:pt idx="117" formatCode="General">
-                  <c:v>9.708333333333323</c:v>
+                  <c:v>9.708333333333321</c:v>
                 </c:pt>
                 <c:pt idx="118" formatCode="General">
                   <c:v>9.79166666666666</c:v>
@@ -4590,49 +4567,49 @@
                   <c:v>3.875</c:v>
                 </c:pt>
                 <c:pt idx="17">
-                  <c:v>4.124999999999995</c:v>
+                  <c:v>4.124999999999994</c:v>
                 </c:pt>
                 <c:pt idx="18">
                   <c:v>4.375</c:v>
                 </c:pt>
                 <c:pt idx="19">
-                  <c:v>4.624999999999994</c:v>
+                  <c:v>4.624999999999993</c:v>
                 </c:pt>
                 <c:pt idx="20">
                   <c:v>4.875</c:v>
                 </c:pt>
                 <c:pt idx="21">
-                  <c:v>5.124999999999995</c:v>
+                  <c:v>5.124999999999994</c:v>
                 </c:pt>
                 <c:pt idx="22">
                   <c:v>5.375</c:v>
                 </c:pt>
                 <c:pt idx="23">
-                  <c:v>5.624999999999994</c:v>
+                  <c:v>5.624999999999993</c:v>
                 </c:pt>
                 <c:pt idx="24">
                   <c:v>5.875</c:v>
                 </c:pt>
                 <c:pt idx="25">
-                  <c:v>6.124999999999995</c:v>
+                  <c:v>6.124999999999994</c:v>
                 </c:pt>
                 <c:pt idx="26">
                   <c:v>6.375</c:v>
                 </c:pt>
                 <c:pt idx="27">
-                  <c:v>6.624999999999994</c:v>
+                  <c:v>6.624999999999993</c:v>
                 </c:pt>
                 <c:pt idx="28">
                   <c:v>6.875</c:v>
                 </c:pt>
                 <c:pt idx="29">
-                  <c:v>7.124999999999995</c:v>
+                  <c:v>7.124999999999994</c:v>
                 </c:pt>
                 <c:pt idx="30">
                   <c:v>7.375</c:v>
                 </c:pt>
                 <c:pt idx="31">
-                  <c:v>7.624999999999994</c:v>
+                  <c:v>7.624999999999993</c:v>
                 </c:pt>
                 <c:pt idx="32">
                   <c:v>7.875</c:v>
@@ -5168,7 +5145,7 @@
                   <c:v>2.27586206896551</c:v>
                 </c:pt>
                 <c:pt idx="7">
-                  <c:v>2.689655172413786</c:v>
+                  <c:v>2.689655172413785</c:v>
                 </c:pt>
                 <c:pt idx="8">
                   <c:v>3.10344827586206</c:v>
@@ -5180,7 +5157,7 @@
                   <c:v>3.93103448275862</c:v>
                 </c:pt>
                 <c:pt idx="11">
-                  <c:v>4.344827586206886</c:v>
+                  <c:v>4.344827586206885</c:v>
                 </c:pt>
                 <c:pt idx="12">
                   <c:v>4.75862068965517</c:v>
@@ -5198,7 +5175,7 @@
                   <c:v>6.41379310344827</c:v>
                 </c:pt>
                 <c:pt idx="17">
-                  <c:v>6.827586206896539</c:v>
+                  <c:v>6.827586206896536</c:v>
                 </c:pt>
                 <c:pt idx="18">
                   <c:v>7.24137931034482</c:v>
@@ -5219,7 +5196,7 @@
                   <c:v>9.3103448275862</c:v>
                 </c:pt>
                 <c:pt idx="24">
-                  <c:v>9.724137931034473</c:v>
+                  <c:v>9.724137931034471</c:v>
                 </c:pt>
                 <c:pt idx="25">
                   <c:v>10.1379310344827</c:v>
@@ -5596,7 +5573,7 @@
                   <c:v>4.28571428571428</c:v>
                 </c:pt>
                 <c:pt idx="9">
-                  <c:v>4.857142857142846</c:v>
+                  <c:v>4.857142857142845</c:v>
                 </c:pt>
                 <c:pt idx="10">
                   <c:v>5.42857142857142</c:v>
@@ -5611,7 +5588,7 @@
                   <c:v>7.14285714285714</c:v>
                 </c:pt>
                 <c:pt idx="14">
-                  <c:v>7.714285714285706</c:v>
+                  <c:v>7.714285714285705</c:v>
                 </c:pt>
                 <c:pt idx="15">
                   <c:v>8.28571428571428</c:v>
@@ -5620,7 +5597,7 @@
                   <c:v>8.85714285714285</c:v>
                 </c:pt>
                 <c:pt idx="17">
-                  <c:v>9.428571428571409</c:v>
+                  <c:v>9.428571428571406</c:v>
                 </c:pt>
                 <c:pt idx="18">
                   <c:v>10.0</c:v>
@@ -5882,11 +5859,11 @@
           <c:showPercent val="0"/>
           <c:showBubbleSize val="0"/>
         </c:dLbls>
-        <c:axId val="-2091532408"/>
-        <c:axId val="-2115627288"/>
+        <c:axId val="-2142300136"/>
+        <c:axId val="-2142297112"/>
       </c:scatterChart>
       <c:valAx>
-        <c:axId val="-2091532408"/>
+        <c:axId val="-2142300136"/>
         <c:scaling>
           <c:orientation val="minMax"/>
           <c:max val="3.8"/>
@@ -5898,12 +5875,12 @@
         <c:majorTickMark val="out"/>
         <c:minorTickMark val="none"/>
         <c:tickLblPos val="nextTo"/>
-        <c:crossAx val="-2115627288"/>
+        <c:crossAx val="-2142297112"/>
         <c:crosses val="autoZero"/>
         <c:crossBetween val="midCat"/>
       </c:valAx>
       <c:valAx>
-        <c:axId val="-2115627288"/>
+        <c:axId val="-2142297112"/>
         <c:scaling>
           <c:orientation val="minMax"/>
           <c:max val="2.0"/>
@@ -5915,7 +5892,7 @@
         <c:majorTickMark val="out"/>
         <c:minorTickMark val="none"/>
         <c:tickLblPos val="nextTo"/>
-        <c:crossAx val="-2091532408"/>
+        <c:crossAx val="-2142300136"/>
         <c:crosses val="autoZero"/>
         <c:crossBetween val="midCat"/>
         <c:majorUnit val="0.4"/>
@@ -6139,7 +6116,7 @@
           <a:p>
             <a:fld id="{1A6256DC-8C7C-8A42-83C4-F78B274EBBC4}" type="datetimeFigureOut">
               <a:rPr kumimoji="1" lang="zh-CN" altLang="en-US" smtClean="0"/>
-              <a:t>01/01/17</a:t>
+              <a:t>15/01/17</a:t>
             </a:fld>
             <a:endParaRPr kumimoji="1" lang="zh-CN" altLang="en-US"/>
           </a:p>
@@ -6309,7 +6286,7 @@
           <a:p>
             <a:fld id="{1A6256DC-8C7C-8A42-83C4-F78B274EBBC4}" type="datetimeFigureOut">
               <a:rPr kumimoji="1" lang="zh-CN" altLang="en-US" smtClean="0"/>
-              <a:t>01/01/17</a:t>
+              <a:t>15/01/17</a:t>
             </a:fld>
             <a:endParaRPr kumimoji="1" lang="zh-CN" altLang="en-US"/>
           </a:p>
@@ -6489,7 +6466,7 @@
           <a:p>
             <a:fld id="{1A6256DC-8C7C-8A42-83C4-F78B274EBBC4}" type="datetimeFigureOut">
               <a:rPr kumimoji="1" lang="zh-CN" altLang="en-US" smtClean="0"/>
-              <a:t>01/01/17</a:t>
+              <a:t>15/01/17</a:t>
             </a:fld>
             <a:endParaRPr kumimoji="1" lang="zh-CN" altLang="en-US"/>
           </a:p>
@@ -6659,7 +6636,7 @@
           <a:p>
             <a:fld id="{1A6256DC-8C7C-8A42-83C4-F78B274EBBC4}" type="datetimeFigureOut">
               <a:rPr kumimoji="1" lang="zh-CN" altLang="en-US" smtClean="0"/>
-              <a:t>01/01/17</a:t>
+              <a:t>15/01/17</a:t>
             </a:fld>
             <a:endParaRPr kumimoji="1" lang="zh-CN" altLang="en-US"/>
           </a:p>
@@ -6905,7 +6882,7 @@
           <a:p>
             <a:fld id="{1A6256DC-8C7C-8A42-83C4-F78B274EBBC4}" type="datetimeFigureOut">
               <a:rPr kumimoji="1" lang="zh-CN" altLang="en-US" smtClean="0"/>
-              <a:t>01/01/17</a:t>
+              <a:t>15/01/17</a:t>
             </a:fld>
             <a:endParaRPr kumimoji="1" lang="zh-CN" altLang="en-US"/>
           </a:p>
@@ -7193,7 +7170,7 @@
           <a:p>
             <a:fld id="{1A6256DC-8C7C-8A42-83C4-F78B274EBBC4}" type="datetimeFigureOut">
               <a:rPr kumimoji="1" lang="zh-CN" altLang="en-US" smtClean="0"/>
-              <a:t>01/01/17</a:t>
+              <a:t>15/01/17</a:t>
             </a:fld>
             <a:endParaRPr kumimoji="1" lang="zh-CN" altLang="en-US"/>
           </a:p>
@@ -7615,7 +7592,7 @@
           <a:p>
             <a:fld id="{1A6256DC-8C7C-8A42-83C4-F78B274EBBC4}" type="datetimeFigureOut">
               <a:rPr kumimoji="1" lang="zh-CN" altLang="en-US" smtClean="0"/>
-              <a:t>01/01/17</a:t>
+              <a:t>15/01/17</a:t>
             </a:fld>
             <a:endParaRPr kumimoji="1" lang="zh-CN" altLang="en-US"/>
           </a:p>
@@ -7733,7 +7710,7 @@
           <a:p>
             <a:fld id="{1A6256DC-8C7C-8A42-83C4-F78B274EBBC4}" type="datetimeFigureOut">
               <a:rPr kumimoji="1" lang="zh-CN" altLang="en-US" smtClean="0"/>
-              <a:t>01/01/17</a:t>
+              <a:t>15/01/17</a:t>
             </a:fld>
             <a:endParaRPr kumimoji="1" lang="zh-CN" altLang="en-US"/>
           </a:p>
@@ -7828,7 +7805,7 @@
           <a:p>
             <a:fld id="{1A6256DC-8C7C-8A42-83C4-F78B274EBBC4}" type="datetimeFigureOut">
               <a:rPr kumimoji="1" lang="zh-CN" altLang="en-US" smtClean="0"/>
-              <a:t>01/01/17</a:t>
+              <a:t>15/01/17</a:t>
             </a:fld>
             <a:endParaRPr kumimoji="1" lang="zh-CN" altLang="en-US"/>
           </a:p>
@@ -8105,7 +8082,7 @@
           <a:p>
             <a:fld id="{1A6256DC-8C7C-8A42-83C4-F78B274EBBC4}" type="datetimeFigureOut">
               <a:rPr kumimoji="1" lang="zh-CN" altLang="en-US" smtClean="0"/>
-              <a:t>01/01/17</a:t>
+              <a:t>15/01/17</a:t>
             </a:fld>
             <a:endParaRPr kumimoji="1" lang="zh-CN" altLang="en-US"/>
           </a:p>
@@ -8358,7 +8335,7 @@
           <a:p>
             <a:fld id="{1A6256DC-8C7C-8A42-83C4-F78B274EBBC4}" type="datetimeFigureOut">
               <a:rPr kumimoji="1" lang="zh-CN" altLang="en-US" smtClean="0"/>
-              <a:t>01/01/17</a:t>
+              <a:t>15/01/17</a:t>
             </a:fld>
             <a:endParaRPr kumimoji="1" lang="zh-CN" altLang="en-US"/>
           </a:p>
@@ -8571,7 +8548,7 @@
           <a:p>
             <a:fld id="{1A6256DC-8C7C-8A42-83C4-F78B274EBBC4}" type="datetimeFigureOut">
               <a:rPr kumimoji="1" lang="zh-CN" altLang="en-US" smtClean="0"/>
-              <a:t>01/01/17</a:t>
+              <a:t>15/01/17</a:t>
             </a:fld>
             <a:endParaRPr kumimoji="1" lang="zh-CN" altLang="en-US"/>
           </a:p>
@@ -8955,7 +8932,7 @@
           <p:nvPr>
             <p:extLst>
               <p:ext uri="{D42A27DB-BD31-4B8C-83A1-F6EECF244321}">
-                <p14:modId xmlns:p14="http://schemas.microsoft.com/office/powerpoint/2010/main" val="813615648"/>
+                <p14:modId xmlns:p14="http://schemas.microsoft.com/office/powerpoint/2010/main" val="2754650822"/>
               </p:ext>
             </p:extLst>
           </p:nvPr>
@@ -8978,8 +8955,8 @@
         </p:nvSpPr>
         <p:spPr>
           <a:xfrm>
-            <a:off x="2044123" y="1104420"/>
-            <a:ext cx="1342587" cy="1786477"/>
+            <a:off x="2276150" y="1104420"/>
+            <a:ext cx="1301959" cy="1692259"/>
           </a:xfrm>
           <a:prstGeom prst="rect">
             <a:avLst/>
@@ -9023,14 +9000,14 @@
           <p:nvPr>
             <p:extLst>
               <p:ext uri="{D42A27DB-BD31-4B8C-83A1-F6EECF244321}">
-                <p14:modId xmlns:p14="http://schemas.microsoft.com/office/powerpoint/2010/main" val="2646193001"/>
+                <p14:modId xmlns:p14="http://schemas.microsoft.com/office/powerpoint/2010/main" val="1236951075"/>
               </p:ext>
             </p:extLst>
           </p:nvPr>
         </p:nvGraphicFramePr>
         <p:xfrm>
           <a:off x="4285307" y="51133"/>
-          <a:ext cx="7488748" cy="3200768"/>
+          <a:ext cx="7587700" cy="3200768"/>
         </p:xfrm>
         <a:graphic>
           <a:graphicData uri="http://schemas.openxmlformats.org/drawingml/2006/chart">

</xml_diff>